<commit_message>
Update Another AI Path Building Genetic Algorithms in C^LN and .NET.pptx
</commit_message>
<xml_diff>
--- a/Another AI Path Building Genetic Algorithms in C^LN and .NET.pptx
+++ b/Another AI Path Building Genetic Algorithms in C^LN and .NET.pptx
@@ -15687,7 +15687,7 @@
             <a:pPr marL="0" indent="0"/>
             <a:r>
               <a:rPr lang="en-US" dirty="0"/>
-              <a:t>Collection of individual DNAs</a:t>
+              <a:t>Collection of individual Genomes</a:t>
             </a:r>
             <a:endParaRPr dirty="0"/>
           </a:p>
@@ -15763,7 +15763,7 @@
             <a:pPr marL="0" indent="0"/>
             <a:r>
               <a:rPr lang="en-US" dirty="0"/>
-              <a:t>Objective function which calculates the score of a DNA</a:t>
+              <a:t>Objective function which calculates the score of a Genome</a:t>
             </a:r>
             <a:endParaRPr dirty="0"/>
           </a:p>
@@ -15835,7 +15835,7 @@
             </a:pPr>
             <a:r>
               <a:rPr lang="en-US" dirty="0"/>
-              <a:t>A strategy to select parent DNAs for reproduction based on their fitness</a:t>
+              <a:t>A strategy to select parent Genomes for reproduction based on their fitness</a:t>
             </a:r>
             <a:endParaRPr dirty="0"/>
           </a:p>
@@ -15902,7 +15902,7 @@
             <a:pPr marL="0" indent="0"/>
             <a:r>
               <a:rPr lang="en-US" dirty="0"/>
-              <a:t>A strategy to copy genes from parent DNAs to create new child DNAs</a:t>
+              <a:t>A strategy to copy genes from parent Genomes to create new child Genomes</a:t>
             </a:r>
           </a:p>
         </p:txBody>
@@ -21789,7 +21789,7 @@
             <a:pPr marL="0" indent="0"/>
             <a:r>
               <a:rPr lang="en-US" dirty="0"/>
-              <a:t>A new population of evolved DNA</a:t>
+              <a:t>A new population of evolved Genomes</a:t>
             </a:r>
           </a:p>
         </p:txBody>
@@ -22362,7 +22362,7 @@
             <a:pPr marL="0" indent="0"/>
             <a:r>
               <a:rPr lang="en-US" dirty="0"/>
-              <a:t>A (random) change of one or more genes in a DNA</a:t>
+              <a:t>A (random) change of one or more genes in a Genomes</a:t>
             </a:r>
           </a:p>
         </p:txBody>
@@ -34554,123 +34554,6 @@
   <p:clrMapOvr>
     <a:masterClrMapping/>
   </p:clrMapOvr>
-  <p:timing>
-    <p:tnLst>
-      <p:par>
-        <p:cTn id="1" dur="indefinite" restart="never" nodeType="tmRoot">
-          <p:childTnLst>
-            <p:seq concurrent="1" nextAc="seek">
-              <p:cTn id="2" dur="indefinite" nodeType="mainSeq">
-                <p:childTnLst>
-                  <p:par>
-                    <p:cTn id="3" fill="hold">
-                      <p:stCondLst>
-                        <p:cond delay="indefinite"/>
-                        <p:cond evt="onBegin" delay="0">
-                          <p:tn val="2"/>
-                        </p:cond>
-                      </p:stCondLst>
-                      <p:childTnLst>
-                        <p:par>
-                          <p:cTn id="4" fill="hold">
-                            <p:stCondLst>
-                              <p:cond delay="0"/>
-                            </p:stCondLst>
-                            <p:childTnLst>
-                              <p:par>
-                                <p:cTn id="5" presetID="1" presetClass="entr" presetSubtype="0" fill="hold" grpId="0" nodeType="withEffect">
-                                  <p:stCondLst>
-                                    <p:cond delay="0"/>
-                                  </p:stCondLst>
-                                  <p:childTnLst>
-                                    <p:set>
-                                      <p:cBhvr>
-                                        <p:cTn id="6" dur="1" fill="hold">
-                                          <p:stCondLst>
-                                            <p:cond delay="0"/>
-                                          </p:stCondLst>
-                                        </p:cTn>
-                                        <p:tgtEl>
-                                          <p:spTgt spid="6">
-                                            <p:txEl>
-                                              <p:pRg st="0" end="0"/>
-                                            </p:txEl>
-                                          </p:spTgt>
-                                        </p:tgtEl>
-                                        <p:attrNameLst>
-                                          <p:attrName>style.visibility</p:attrName>
-                                        </p:attrNameLst>
-                                      </p:cBhvr>
-                                      <p:to>
-                                        <p:strVal val="visible"/>
-                                      </p:to>
-                                    </p:set>
-                                  </p:childTnLst>
-                                </p:cTn>
-                              </p:par>
-                              <p:par>
-                                <p:cTn id="7" presetID="1" presetClass="entr" presetSubtype="0" fill="hold" grpId="0" nodeType="withEffect">
-                                  <p:stCondLst>
-                                    <p:cond delay="0"/>
-                                  </p:stCondLst>
-                                  <p:childTnLst>
-                                    <p:set>
-                                      <p:cBhvr>
-                                        <p:cTn id="8" dur="1" fill="hold">
-                                          <p:stCondLst>
-                                            <p:cond delay="0"/>
-                                          </p:stCondLst>
-                                        </p:cTn>
-                                        <p:tgtEl>
-                                          <p:spTgt spid="7">
-                                            <p:txEl>
-                                              <p:pRg st="0" end="0"/>
-                                            </p:txEl>
-                                          </p:spTgt>
-                                        </p:tgtEl>
-                                        <p:attrNameLst>
-                                          <p:attrName>style.visibility</p:attrName>
-                                        </p:attrNameLst>
-                                      </p:cBhvr>
-                                      <p:to>
-                                        <p:strVal val="visible"/>
-                                      </p:to>
-                                    </p:set>
-                                  </p:childTnLst>
-                                </p:cTn>
-                              </p:par>
-                            </p:childTnLst>
-                          </p:cTn>
-                        </p:par>
-                      </p:childTnLst>
-                    </p:cTn>
-                  </p:par>
-                </p:childTnLst>
-              </p:cTn>
-              <p:prevCondLst>
-                <p:cond evt="onPrev" delay="0">
-                  <p:tgtEl>
-                    <p:sldTgt/>
-                  </p:tgtEl>
-                </p:cond>
-              </p:prevCondLst>
-              <p:nextCondLst>
-                <p:cond evt="onNext" delay="0">
-                  <p:tgtEl>
-                    <p:sldTgt/>
-                  </p:tgtEl>
-                </p:cond>
-              </p:nextCondLst>
-            </p:seq>
-          </p:childTnLst>
-        </p:cTn>
-      </p:par>
-    </p:tnLst>
-    <p:bldLst>
-      <p:bldP spid="6" grpId="0" build="p"/>
-      <p:bldP spid="7" grpId="0" build="p"/>
-    </p:bldLst>
-  </p:timing>
 </p:sld>
 </file>
 

</xml_diff>

<commit_message>
updated slides and code cleanup
</commit_message>
<xml_diff>
--- a/Another AI Path Building Genetic Algorithms in C^LN and .NET.pptx
+++ b/Another AI Path Building Genetic Algorithms in C^LN and .NET.pptx
@@ -358,7 +358,7 @@
           <a:p>
             <a:fld id="{249989A5-66D3-413A-AF0E-8EF3AB32FA8C}" type="datetimeFigureOut">
               <a:rPr lang="en-US" smtClean="0"/>
-              <a:t>11/18/2021</a:t>
+              <a:t>11/19/2021</a:t>
             </a:fld>
             <a:endParaRPr lang="en-US"/>
           </a:p>
@@ -8231,7 +8231,7 @@
                 <a:hlinkClick r:id="rId3">
                   <a:extLst>
                     <a:ext uri="{A12FA001-AC4F-418D-AE19-62706E023703}">
-                      <ahyp:hlinkClr xmlns:ahyp="http://schemas.microsoft.com/office/drawing/2018/hyperlinkcolor" val="tx"/>
+                      <ahyp:hlinkClr xmlns:ahyp="http://schemas.microsoft.com/office/drawing/2018/hyperlinkcolor" xmlns="" val="tx"/>
                     </a:ext>
                   </a:extLst>
                 </a:hlinkClick>
@@ -8265,7 +8265,7 @@
                 <a:hlinkClick r:id="rId4">
                   <a:extLst>
                     <a:ext uri="{A12FA001-AC4F-418D-AE19-62706E023703}">
-                      <ahyp:hlinkClr xmlns:ahyp="http://schemas.microsoft.com/office/drawing/2018/hyperlinkcolor" val="tx"/>
+                      <ahyp:hlinkClr xmlns:ahyp="http://schemas.microsoft.com/office/drawing/2018/hyperlinkcolor" xmlns="" val="tx"/>
                     </a:ext>
                   </a:extLst>
                 </a:hlinkClick>
@@ -8299,7 +8299,7 @@
                 <a:hlinkClick r:id="rId5">
                   <a:extLst>
                     <a:ext uri="{A12FA001-AC4F-418D-AE19-62706E023703}">
-                      <ahyp:hlinkClr xmlns:ahyp="http://schemas.microsoft.com/office/drawing/2018/hyperlinkcolor" val="tx"/>
+                      <ahyp:hlinkClr xmlns:ahyp="http://schemas.microsoft.com/office/drawing/2018/hyperlinkcolor" xmlns="" val="tx"/>
                     </a:ext>
                   </a:extLst>
                 </a:hlinkClick>
@@ -15406,6 +15406,13 @@
   <p:clrMapOvr>
     <a:masterClrMapping/>
   </p:clrMapOvr>
+  <p:timing>
+    <p:tnLst>
+      <p:par>
+        <p:cTn id="1" dur="indefinite" restart="never" nodeType="tmRoot"/>
+      </p:par>
+    </p:tnLst>
+  </p:timing>
 </p:sld>
 </file>
 
@@ -15718,12 +15725,24 @@
           </a:bodyPr>
           <a:lstStyle/>
           <a:p>
+            <a:r>
+              <a:rPr lang="en-US" dirty="0"/>
+              <a:t/>
+            </a:r>
             <a:br>
               <a:rPr lang="en-US" dirty="0"/>
             </a:br>
+            <a:r>
+              <a:rPr lang="en-US" dirty="0"/>
+              <a:t/>
+            </a:r>
             <a:br>
               <a:rPr lang="en-US" dirty="0"/>
             </a:br>
+            <a:r>
+              <a:rPr lang="en-US" dirty="0"/>
+              <a:t/>
+            </a:r>
             <a:br>
               <a:rPr lang="en-US" dirty="0"/>
             </a:br>
@@ -30365,6 +30384,13 @@
   <p:clrMapOvr>
     <a:masterClrMapping/>
   </p:clrMapOvr>
+  <p:timing>
+    <p:tnLst>
+      <p:par>
+        <p:cTn id="1" dur="indefinite" restart="never" nodeType="tmRoot"/>
+      </p:par>
+    </p:tnLst>
+  </p:timing>
 </p:sld>
 </file>
 
@@ -30385,6 +30411,46 @@
           <a:chExt cx="0" cy="0"/>
         </a:xfrm>
       </p:grpSpPr>
+      <p:sp>
+        <p:nvSpPr>
+          <p:cNvPr id="4" name="Text Placeholder 3">
+            <a:extLst>
+              <a:ext uri="{FF2B5EF4-FFF2-40B4-BE49-F238E27FC236}">
+                <a16:creationId xmlns:a16="http://schemas.microsoft.com/office/drawing/2014/main" id="{C1B3F6E7-710C-4304-9649-4CD647E45257}"/>
+              </a:ext>
+            </a:extLst>
+          </p:cNvPr>
+          <p:cNvSpPr>
+            <a:spLocks noGrp="1"/>
+          </p:cNvSpPr>
+          <p:nvPr>
+            <p:ph type="body" idx="2"/>
+          </p:nvPr>
+        </p:nvSpPr>
+        <p:spPr>
+          <a:xfrm>
+            <a:off x="913782" y="4789170"/>
+            <a:ext cx="3932538" cy="1777972"/>
+          </a:xfrm>
+        </p:spPr>
+        <p:txBody>
+          <a:bodyPr/>
+          <a:lstStyle/>
+          <a:p>
+            <a:pPr marL="169329" indent="0">
+              <a:buNone/>
+            </a:pPr>
+            <a:r>
+              <a:rPr lang="en-US" b="1" dirty="0"/>
+              <a:t>Elitism</a:t>
+            </a:r>
+            <a:r>
+              <a:rPr lang="en-US" dirty="0"/>
+              <a:t> means that the genomes with the highest fitness values are guaranteed a place in the next generation</a:t>
+            </a:r>
+          </a:p>
+        </p:txBody>
+      </p:sp>
       <p:sp>
         <p:nvSpPr>
           <p:cNvPr id="3" name="Title 2">
@@ -30415,49 +30481,26 @@
       </p:sp>
       <p:pic>
         <p:nvPicPr>
-          <p:cNvPr id="6146" name="Picture 2" descr="See the source image">
-            <a:extLst>
-              <a:ext uri="{FF2B5EF4-FFF2-40B4-BE49-F238E27FC236}">
-                <a16:creationId xmlns:a16="http://schemas.microsoft.com/office/drawing/2014/main" id="{5CB9AB8B-33B8-4E25-88FA-A40A59D57368}"/>
-              </a:ext>
-            </a:extLst>
-          </p:cNvPr>
+          <p:cNvPr id="2" name="Picture 1"/>
           <p:cNvPicPr>
-            <a:picLocks noChangeAspect="1" noChangeArrowheads="1"/>
+            <a:picLocks noChangeAspect="1"/>
           </p:cNvPicPr>
           <p:nvPr/>
         </p:nvPicPr>
         <p:blipFill>
-          <a:blip r:embed="rId2">
-            <a:extLst>
-              <a:ext uri="{28A0092B-C50C-407E-A947-70E740481C1C}">
-                <a14:useLocalDpi xmlns:a14="http://schemas.microsoft.com/office/drawing/2010/main" val="0"/>
-              </a:ext>
-            </a:extLst>
-          </a:blip>
-          <a:srcRect/>
+          <a:blip r:embed="rId2"/>
           <a:stretch>
             <a:fillRect/>
           </a:stretch>
         </p:blipFill>
-        <p:spPr bwMode="auto">
+        <p:spPr>
           <a:xfrm>
-            <a:off x="1109167" y="1356967"/>
-            <a:ext cx="7762875" cy="5210175"/>
+            <a:off x="5621520" y="805680"/>
+            <a:ext cx="5728470" cy="5728470"/>
           </a:xfrm>
           <a:prstGeom prst="rect">
             <a:avLst/>
           </a:prstGeom>
-          <a:noFill/>
-          <a:extLst>
-            <a:ext uri="{909E8E84-426E-40DD-AFC4-6F175D3DCCD1}">
-              <a14:hiddenFill xmlns:a14="http://schemas.microsoft.com/office/drawing/2010/main">
-                <a:solidFill>
-                  <a:srgbClr val="FFFFFF"/>
-                </a:solidFill>
-              </a14:hiddenFill>
-            </a:ext>
-          </a:extLst>
         </p:spPr>
       </p:pic>
     </p:spTree>
@@ -30470,6 +30513,88 @@
   <p:clrMapOvr>
     <a:masterClrMapping/>
   </p:clrMapOvr>
+  <p:timing>
+    <p:tnLst>
+      <p:par>
+        <p:cTn id="1" dur="indefinite" restart="never" nodeType="tmRoot">
+          <p:childTnLst>
+            <p:seq concurrent="1" nextAc="seek">
+              <p:cTn id="2" dur="indefinite" nodeType="mainSeq">
+                <p:childTnLst>
+                  <p:par>
+                    <p:cTn id="3" fill="hold">
+                      <p:stCondLst>
+                        <p:cond delay="indefinite"/>
+                      </p:stCondLst>
+                      <p:childTnLst>
+                        <p:par>
+                          <p:cTn id="4" fill="hold">
+                            <p:stCondLst>
+                              <p:cond delay="0"/>
+                            </p:stCondLst>
+                            <p:childTnLst>
+                              <p:par>
+                                <p:cTn id="5" presetID="1" presetClass="entr" presetSubtype="0" fill="hold" grpId="0" nodeType="clickEffect">
+                                  <p:stCondLst>
+                                    <p:cond delay="0"/>
+                                  </p:stCondLst>
+                                  <p:childTnLst>
+                                    <p:set>
+                                      <p:cBhvr>
+                                        <p:cTn id="6" dur="1" fill="hold">
+                                          <p:stCondLst>
+                                            <p:cond delay="0"/>
+                                          </p:stCondLst>
+                                        </p:cTn>
+                                        <p:tgtEl>
+                                          <p:spTgt spid="4">
+                                            <p:txEl>
+                                              <p:pRg st="0" end="0"/>
+                                            </p:txEl>
+                                          </p:spTgt>
+                                        </p:tgtEl>
+                                        <p:attrNameLst>
+                                          <p:attrName>style.visibility</p:attrName>
+                                        </p:attrNameLst>
+                                      </p:cBhvr>
+                                      <p:to>
+                                        <p:strVal val="visible"/>
+                                      </p:to>
+                                    </p:set>
+                                  </p:childTnLst>
+                                </p:cTn>
+                              </p:par>
+                            </p:childTnLst>
+                          </p:cTn>
+                        </p:par>
+                      </p:childTnLst>
+                    </p:cTn>
+                  </p:par>
+                </p:childTnLst>
+              </p:cTn>
+              <p:prevCondLst>
+                <p:cond evt="onPrev" delay="0">
+                  <p:tgtEl>
+                    <p:sldTgt/>
+                  </p:tgtEl>
+                </p:cond>
+              </p:prevCondLst>
+              <p:nextCondLst>
+                <p:cond evt="onNext" delay="0">
+                  <p:tgtEl>
+                    <p:sldTgt/>
+                  </p:tgtEl>
+                </p:cond>
+              </p:nextCondLst>
+            </p:seq>
+          </p:childTnLst>
+        </p:cTn>
+      </p:par>
+    </p:tnLst>
+    <p:bldLst>
+      <p:bldP spid="4" grpId="0" build="p"/>
+    </p:bldLst>
+  </p:timing>
 </p:sld>
 </file>
 
@@ -30520,49 +30645,26 @@
       </p:sp>
       <p:pic>
         <p:nvPicPr>
-          <p:cNvPr id="2050" name="Picture 2" descr="See the source image">
-            <a:extLst>
-              <a:ext uri="{FF2B5EF4-FFF2-40B4-BE49-F238E27FC236}">
-                <a16:creationId xmlns:a16="http://schemas.microsoft.com/office/drawing/2014/main" id="{F660F18C-EC84-47F8-888F-06597E5B6211}"/>
-              </a:ext>
-            </a:extLst>
-          </p:cNvPr>
+          <p:cNvPr id="4" name="Picture 3"/>
           <p:cNvPicPr>
-            <a:picLocks noChangeAspect="1" noChangeArrowheads="1"/>
+            <a:picLocks noChangeAspect="1"/>
           </p:cNvPicPr>
           <p:nvPr/>
         </p:nvPicPr>
         <p:blipFill>
-          <a:blip r:embed="rId2">
-            <a:extLst>
-              <a:ext uri="{28A0092B-C50C-407E-A947-70E740481C1C}">
-                <a14:useLocalDpi xmlns:a14="http://schemas.microsoft.com/office/drawing/2010/main" val="0"/>
-              </a:ext>
-            </a:extLst>
-          </a:blip>
-          <a:srcRect/>
+          <a:blip r:embed="rId2"/>
           <a:stretch>
             <a:fillRect/>
           </a:stretch>
         </p:blipFill>
-        <p:spPr bwMode="auto">
+        <p:spPr>
           <a:xfrm>
-            <a:off x="969889" y="1898403"/>
-            <a:ext cx="9031013" cy="3587997"/>
+            <a:off x="795968" y="1477292"/>
+            <a:ext cx="10098867" cy="4818000"/>
           </a:xfrm>
           <a:prstGeom prst="rect">
             <a:avLst/>
           </a:prstGeom>
-          <a:noFill/>
-          <a:extLst>
-            <a:ext uri="{909E8E84-426E-40DD-AFC4-6F175D3DCCD1}">
-              <a14:hiddenFill xmlns:a14="http://schemas.microsoft.com/office/drawing/2010/main">
-                <a:solidFill>
-                  <a:srgbClr val="FFFFFF"/>
-                </a:solidFill>
-              </a14:hiddenFill>
-            </a:ext>
-          </a:extLst>
         </p:spPr>
       </p:pic>
     </p:spTree>
@@ -30575,6 +30677,13 @@
   <p:clrMapOvr>
     <a:masterClrMapping/>
   </p:clrMapOvr>
+  <p:timing>
+    <p:tnLst>
+      <p:par>
+        <p:cTn id="1" dur="indefinite" restart="never" nodeType="tmRoot"/>
+      </p:par>
+    </p:tnLst>
+  </p:timing>
 </p:sld>
 </file>
 
@@ -30625,49 +30734,26 @@
       </p:sp>
       <p:pic>
         <p:nvPicPr>
-          <p:cNvPr id="3074" name="Picture 2" descr="See the source image">
-            <a:extLst>
-              <a:ext uri="{FF2B5EF4-FFF2-40B4-BE49-F238E27FC236}">
-                <a16:creationId xmlns:a16="http://schemas.microsoft.com/office/drawing/2014/main" id="{72D6CA89-364A-41CD-8DE3-490A3533A3FD}"/>
-              </a:ext>
-            </a:extLst>
-          </p:cNvPr>
+          <p:cNvPr id="2" name="Picture 1"/>
           <p:cNvPicPr>
-            <a:picLocks noChangeAspect="1" noChangeArrowheads="1"/>
+            <a:picLocks noChangeAspect="1"/>
           </p:cNvPicPr>
           <p:nvPr/>
         </p:nvPicPr>
         <p:blipFill>
-          <a:blip r:embed="rId2">
-            <a:extLst>
-              <a:ext uri="{28A0092B-C50C-407E-A947-70E740481C1C}">
-                <a14:useLocalDpi xmlns:a14="http://schemas.microsoft.com/office/drawing/2010/main" val="0"/>
-              </a:ext>
-            </a:extLst>
-          </a:blip>
-          <a:srcRect/>
+          <a:blip r:embed="rId2"/>
           <a:stretch>
             <a:fillRect/>
           </a:stretch>
         </p:blipFill>
-        <p:spPr bwMode="auto">
+        <p:spPr>
           <a:xfrm>
-            <a:off x="1109167" y="2090650"/>
-            <a:ext cx="9947943" cy="3420917"/>
+            <a:off x="733938" y="1648454"/>
+            <a:ext cx="10670218" cy="4553054"/>
           </a:xfrm>
           <a:prstGeom prst="rect">
             <a:avLst/>
           </a:prstGeom>
-          <a:noFill/>
-          <a:extLst>
-            <a:ext uri="{909E8E84-426E-40DD-AFC4-6F175D3DCCD1}">
-              <a14:hiddenFill xmlns:a14="http://schemas.microsoft.com/office/drawing/2010/main">
-                <a:solidFill>
-                  <a:srgbClr val="FFFFFF"/>
-                </a:solidFill>
-              </a14:hiddenFill>
-            </a:ext>
-          </a:extLst>
         </p:spPr>
       </p:pic>
     </p:spTree>
@@ -30680,6 +30766,13 @@
   <p:clrMapOvr>
     <a:masterClrMapping/>
   </p:clrMapOvr>
+  <p:timing>
+    <p:tnLst>
+      <p:par>
+        <p:cTn id="1" dur="indefinite" restart="never" nodeType="tmRoot"/>
+      </p:par>
+    </p:tnLst>
+  </p:timing>
 </p:sld>
 </file>
 
@@ -31062,6 +31155,10 @@
                 <a:hlinkClick r:id="rId3"/>
               </a:rPr>
               <a:t>cwoodruff@live.com</a:t>
+            </a:r>
+            <a:r>
+              <a:rPr lang="en-US" sz="3200" dirty="0"/>
+              <a:t/>
             </a:r>
             <a:br>
               <a:rPr lang="en-US" sz="3200" dirty="0"/>

</xml_diff>